<commit_message>
Update ISS IPA PROJECT PRESENTATION - PROMOTIONAL VIDEO.pptx
</commit_message>
<xml_diff>
--- a/Video/ISS IPA PROJECT PRESENTATION - PROMOTIONAL VIDEO.pptx
+++ b/Video/ISS IPA PROJECT PRESENTATION - PROMOTIONAL VIDEO.pptx
@@ -447,7 +447,7 @@
           <a:p>
             <a:fld id="{A5DFF91C-4E09-4FFC-8A24-B7B9DFB15E04}" type="datetimeFigureOut">
               <a:rPr lang="en-SG" smtClean="0"/>
-              <a:t>22/4/2021</a:t>
+              <a:t>25/4/2021</a:t>
             </a:fld>
             <a:endParaRPr lang="en-SG"/>
           </a:p>
@@ -647,7 +647,7 @@
           <a:p>
             <a:fld id="{A5DFF91C-4E09-4FFC-8A24-B7B9DFB15E04}" type="datetimeFigureOut">
               <a:rPr lang="en-SG" smtClean="0"/>
-              <a:t>22/4/2021</a:t>
+              <a:t>25/4/2021</a:t>
             </a:fld>
             <a:endParaRPr lang="en-SG"/>
           </a:p>
@@ -857,7 +857,7 @@
           <a:p>
             <a:fld id="{A5DFF91C-4E09-4FFC-8A24-B7B9DFB15E04}" type="datetimeFigureOut">
               <a:rPr lang="en-SG" smtClean="0"/>
-              <a:t>22/4/2021</a:t>
+              <a:t>25/4/2021</a:t>
             </a:fld>
             <a:endParaRPr lang="en-SG"/>
           </a:p>
@@ -1057,7 +1057,7 @@
           <a:p>
             <a:fld id="{A5DFF91C-4E09-4FFC-8A24-B7B9DFB15E04}" type="datetimeFigureOut">
               <a:rPr lang="en-SG" smtClean="0"/>
-              <a:t>22/4/2021</a:t>
+              <a:t>25/4/2021</a:t>
             </a:fld>
             <a:endParaRPr lang="en-SG"/>
           </a:p>
@@ -1333,7 +1333,7 @@
           <a:p>
             <a:fld id="{A5DFF91C-4E09-4FFC-8A24-B7B9DFB15E04}" type="datetimeFigureOut">
               <a:rPr lang="en-SG" smtClean="0"/>
-              <a:t>22/4/2021</a:t>
+              <a:t>25/4/2021</a:t>
             </a:fld>
             <a:endParaRPr lang="en-SG"/>
           </a:p>
@@ -1601,7 +1601,7 @@
           <a:p>
             <a:fld id="{A5DFF91C-4E09-4FFC-8A24-B7B9DFB15E04}" type="datetimeFigureOut">
               <a:rPr lang="en-SG" smtClean="0"/>
-              <a:t>22/4/2021</a:t>
+              <a:t>25/4/2021</a:t>
             </a:fld>
             <a:endParaRPr lang="en-SG"/>
           </a:p>
@@ -2016,7 +2016,7 @@
           <a:p>
             <a:fld id="{A5DFF91C-4E09-4FFC-8A24-B7B9DFB15E04}" type="datetimeFigureOut">
               <a:rPr lang="en-SG" smtClean="0"/>
-              <a:t>22/4/2021</a:t>
+              <a:t>25/4/2021</a:t>
             </a:fld>
             <a:endParaRPr lang="en-SG"/>
           </a:p>
@@ -2158,7 +2158,7 @@
           <a:p>
             <a:fld id="{A5DFF91C-4E09-4FFC-8A24-B7B9DFB15E04}" type="datetimeFigureOut">
               <a:rPr lang="en-SG" smtClean="0"/>
-              <a:t>22/4/2021</a:t>
+              <a:t>25/4/2021</a:t>
             </a:fld>
             <a:endParaRPr lang="en-SG"/>
           </a:p>
@@ -2271,7 +2271,7 @@
           <a:p>
             <a:fld id="{A5DFF91C-4E09-4FFC-8A24-B7B9DFB15E04}" type="datetimeFigureOut">
               <a:rPr lang="en-SG" smtClean="0"/>
-              <a:t>22/4/2021</a:t>
+              <a:t>25/4/2021</a:t>
             </a:fld>
             <a:endParaRPr lang="en-SG"/>
           </a:p>
@@ -2584,7 +2584,7 @@
           <a:p>
             <a:fld id="{A5DFF91C-4E09-4FFC-8A24-B7B9DFB15E04}" type="datetimeFigureOut">
               <a:rPr lang="en-SG" smtClean="0"/>
-              <a:t>22/4/2021</a:t>
+              <a:t>25/4/2021</a:t>
             </a:fld>
             <a:endParaRPr lang="en-SG"/>
           </a:p>
@@ -2873,7 +2873,7 @@
           <a:p>
             <a:fld id="{A5DFF91C-4E09-4FFC-8A24-B7B9DFB15E04}" type="datetimeFigureOut">
               <a:rPr lang="en-SG" smtClean="0"/>
-              <a:t>22/4/2021</a:t>
+              <a:t>25/4/2021</a:t>
             </a:fld>
             <a:endParaRPr lang="en-SG"/>
           </a:p>
@@ -3116,7 +3116,7 @@
           <a:p>
             <a:fld id="{A5DFF91C-4E09-4FFC-8A24-B7B9DFB15E04}" type="datetimeFigureOut">
               <a:rPr lang="en-SG" smtClean="0"/>
-              <a:t>22/4/2021</a:t>
+              <a:t>25/4/2021</a:t>
             </a:fld>
             <a:endParaRPr lang="en-SG"/>
           </a:p>

</xml_diff>